<commit_message>
updated animations for the presentation
</commit_message>
<xml_diff>
--- a/AwsIntroduction.pptx
+++ b/AwsIntroduction.pptx
@@ -375,7 +375,7 @@
           <a:p>
             <a:fld id="{760C34C5-E0D6-4450-83DD-CD254C0A7A9E}" type="datetimeFigureOut">
               <a:rPr lang="en-US" smtClean="0"/>
-              <a:t>10/13/2020</a:t>
+              <a:t>11/02/2020</a:t>
             </a:fld>
             <a:endParaRPr lang="en-US"/>
           </a:p>
@@ -583,7 +583,7 @@
           <a:p>
             <a:fld id="{760C34C5-E0D6-4450-83DD-CD254C0A7A9E}" type="datetimeFigureOut">
               <a:rPr lang="en-US" smtClean="0"/>
-              <a:t>10/13/2020</a:t>
+              <a:t>11/02/2020</a:t>
             </a:fld>
             <a:endParaRPr lang="en-US"/>
           </a:p>
@@ -839,7 +839,7 @@
           <a:p>
             <a:fld id="{760C34C5-E0D6-4450-83DD-CD254C0A7A9E}" type="datetimeFigureOut">
               <a:rPr lang="en-US" smtClean="0"/>
-              <a:t>10/13/2020</a:t>
+              <a:t>11/02/2020</a:t>
             </a:fld>
             <a:endParaRPr lang="en-US"/>
           </a:p>
@@ -1013,7 +1013,7 @@
           <a:p>
             <a:fld id="{760C34C5-E0D6-4450-83DD-CD254C0A7A9E}" type="datetimeFigureOut">
               <a:rPr lang="en-US" smtClean="0"/>
-              <a:t>10/13/2020</a:t>
+              <a:t>11/02/2020</a:t>
             </a:fld>
             <a:endParaRPr lang="en-US"/>
           </a:p>
@@ -1356,7 +1356,7 @@
           <a:p>
             <a:fld id="{760C34C5-E0D6-4450-83DD-CD254C0A7A9E}" type="datetimeFigureOut">
               <a:rPr lang="en-US" smtClean="0"/>
-              <a:t>10/13/2020</a:t>
+              <a:t>11/02/2020</a:t>
             </a:fld>
             <a:endParaRPr lang="en-US"/>
           </a:p>
@@ -1631,7 +1631,7 @@
           <a:p>
             <a:fld id="{760C34C5-E0D6-4450-83DD-CD254C0A7A9E}" type="datetimeFigureOut">
               <a:rPr lang="en-US" smtClean="0"/>
-              <a:t>10/13/2020</a:t>
+              <a:t>11/02/2020</a:t>
             </a:fld>
             <a:endParaRPr lang="en-US"/>
           </a:p>
@@ -2010,7 +2010,7 @@
           <a:p>
             <a:fld id="{760C34C5-E0D6-4450-83DD-CD254C0A7A9E}" type="datetimeFigureOut">
               <a:rPr lang="en-US" smtClean="0"/>
-              <a:t>10/13/2020</a:t>
+              <a:t>11/02/2020</a:t>
             </a:fld>
             <a:endParaRPr lang="en-US"/>
           </a:p>
@@ -2128,7 +2128,7 @@
           <a:p>
             <a:fld id="{760C34C5-E0D6-4450-83DD-CD254C0A7A9E}" type="datetimeFigureOut">
               <a:rPr lang="en-US" smtClean="0"/>
-              <a:t>10/13/2020</a:t>
+              <a:t>11/02/2020</a:t>
             </a:fld>
             <a:endParaRPr lang="en-US"/>
           </a:p>
@@ -2299,7 +2299,7 @@
           <a:p>
             <a:fld id="{760C34C5-E0D6-4450-83DD-CD254C0A7A9E}" type="datetimeFigureOut">
               <a:rPr lang="en-US" smtClean="0"/>
-              <a:t>10/13/2020</a:t>
+              <a:t>11/02/2020</a:t>
             </a:fld>
             <a:endParaRPr lang="en-US"/>
           </a:p>
@@ -2653,7 +2653,7 @@
           <a:p>
             <a:fld id="{760C34C5-E0D6-4450-83DD-CD254C0A7A9E}" type="datetimeFigureOut">
               <a:rPr lang="en-US" smtClean="0"/>
-              <a:t>10/13/2020</a:t>
+              <a:t>11/02/2020</a:t>
             </a:fld>
             <a:endParaRPr lang="en-US"/>
           </a:p>
@@ -3035,7 +3035,7 @@
           <a:p>
             <a:fld id="{760C34C5-E0D6-4450-83DD-CD254C0A7A9E}" type="datetimeFigureOut">
               <a:rPr lang="en-US" smtClean="0"/>
-              <a:t>10/13/2020</a:t>
+              <a:t>11/02/2020</a:t>
             </a:fld>
             <a:endParaRPr lang="en-US"/>
           </a:p>
@@ -3322,7 +3322,7 @@
           <a:p>
             <a:fld id="{760C34C5-E0D6-4450-83DD-CD254C0A7A9E}" type="datetimeFigureOut">
               <a:rPr lang="en-US" smtClean="0"/>
-              <a:t>10/13/2020</a:t>
+              <a:t>11/02/2020</a:t>
             </a:fld>
             <a:endParaRPr lang="en-US"/>
           </a:p>
@@ -12244,7 +12244,7 @@
                             </p:stCondLst>
                             <p:childTnLst>
                               <p:par>
-                                <p:cTn id="5" presetID="10" presetClass="entr" presetSubtype="0" fill="hold" nodeType="clickEffect">
+                                <p:cTn id="5" presetID="10" presetClass="entr" presetSubtype="0" fill="hold" grpId="0" nodeType="clickEffect">
                                   <p:stCondLst>
                                     <p:cond delay="0"/>
                                   </p:stCondLst>
@@ -12257,7 +12257,7 @@
                                           </p:stCondLst>
                                         </p:cTn>
                                         <p:tgtEl>
-                                          <p:spTgt spid="15"/>
+                                          <p:spTgt spid="21"/>
                                         </p:tgtEl>
                                         <p:attrNameLst>
                                           <p:attrName>style.visibility</p:attrName>
@@ -12271,7 +12271,7 @@
                                       <p:cBhvr>
                                         <p:cTn id="7" dur="500"/>
                                         <p:tgtEl>
-                                          <p:spTgt spid="15"/>
+                                          <p:spTgt spid="21"/>
                                         </p:tgtEl>
                                       </p:cBhvr>
                                     </p:animEffect>
@@ -12279,7 +12279,7 @@
                                 </p:cTn>
                               </p:par>
                               <p:par>
-                                <p:cTn id="8" presetID="10" presetClass="entr" presetSubtype="0" fill="hold" grpId="0" nodeType="withEffect">
+                                <p:cTn id="8" presetID="10" presetClass="entr" presetSubtype="0" fill="hold" nodeType="withEffect">
                                   <p:stCondLst>
                                     <p:cond delay="0"/>
                                   </p:stCondLst>
@@ -12287,41 +12287,6 @@
                                     <p:set>
                                       <p:cBhvr>
                                         <p:cTn id="9" dur="1" fill="hold">
-                                          <p:stCondLst>
-                                            <p:cond delay="0"/>
-                                          </p:stCondLst>
-                                        </p:cTn>
-                                        <p:tgtEl>
-                                          <p:spTgt spid="16"/>
-                                        </p:tgtEl>
-                                        <p:attrNameLst>
-                                          <p:attrName>style.visibility</p:attrName>
-                                        </p:attrNameLst>
-                                      </p:cBhvr>
-                                      <p:to>
-                                        <p:strVal val="visible"/>
-                                      </p:to>
-                                    </p:set>
-                                    <p:animEffect transition="in" filter="fade">
-                                      <p:cBhvr>
-                                        <p:cTn id="10" dur="500"/>
-                                        <p:tgtEl>
-                                          <p:spTgt spid="16"/>
-                                        </p:tgtEl>
-                                      </p:cBhvr>
-                                    </p:animEffect>
-                                  </p:childTnLst>
-                                </p:cTn>
-                              </p:par>
-                              <p:par>
-                                <p:cTn id="11" presetID="10" presetClass="entr" presetSubtype="0" fill="hold" nodeType="withEffect">
-                                  <p:stCondLst>
-                                    <p:cond delay="0"/>
-                                  </p:stCondLst>
-                                  <p:childTnLst>
-                                    <p:set>
-                                      <p:cBhvr>
-                                        <p:cTn id="12" dur="1" fill="hold">
                                           <p:stCondLst>
                                             <p:cond delay="0"/>
                                           </p:stCondLst>
@@ -12339,7 +12304,7 @@
                                     </p:set>
                                     <p:animEffect transition="in" filter="fade">
                                       <p:cBhvr>
-                                        <p:cTn id="13" dur="500"/>
+                                        <p:cTn id="10" dur="500"/>
                                         <p:tgtEl>
                                           <p:spTgt spid="17"/>
                                         </p:tgtEl>
@@ -12355,32 +12320,32 @@
                     </p:cTn>
                   </p:par>
                   <p:par>
-                    <p:cTn id="14" fill="hold">
+                    <p:cTn id="11" fill="hold">
                       <p:stCondLst>
                         <p:cond delay="indefinite"/>
                       </p:stCondLst>
                       <p:childTnLst>
                         <p:par>
-                          <p:cTn id="15" fill="hold">
+                          <p:cTn id="12" fill="hold">
                             <p:stCondLst>
                               <p:cond delay="0"/>
                             </p:stCondLst>
                             <p:childTnLst>
                               <p:par>
-                                <p:cTn id="16" presetID="10" presetClass="entr" presetSubtype="0" fill="hold" nodeType="clickEffect">
+                                <p:cTn id="13" presetID="10" presetClass="entr" presetSubtype="0" fill="hold" grpId="0" nodeType="clickEffect">
                                   <p:stCondLst>
                                     <p:cond delay="0"/>
                                   </p:stCondLst>
                                   <p:childTnLst>
                                     <p:set>
                                       <p:cBhvr>
-                                        <p:cTn id="17" dur="1" fill="hold">
+                                        <p:cTn id="14" dur="1" fill="hold">
                                           <p:stCondLst>
                                             <p:cond delay="0"/>
                                           </p:stCondLst>
                                         </p:cTn>
                                         <p:tgtEl>
-                                          <p:spTgt spid="20"/>
+                                          <p:spTgt spid="6"/>
                                         </p:tgtEl>
                                         <p:attrNameLst>
                                           <p:attrName>style.visibility</p:attrName>
@@ -12392,9 +12357,9 @@
                                     </p:set>
                                     <p:animEffect transition="in" filter="fade">
                                       <p:cBhvr>
-                                        <p:cTn id="18" dur="500"/>
+                                        <p:cTn id="15" dur="500"/>
                                         <p:tgtEl>
-                                          <p:spTgt spid="20"/>
+                                          <p:spTgt spid="6"/>
                                         </p:tgtEl>
                                       </p:cBhvr>
                                     </p:animEffect>
@@ -12402,49 +12367,14 @@
                                 </p:cTn>
                               </p:par>
                               <p:par>
-                                <p:cTn id="19" presetID="10" presetClass="entr" presetSubtype="0" fill="hold" grpId="0" nodeType="withEffect">
+                                <p:cTn id="16" presetID="10" presetClass="entr" presetSubtype="0" fill="hold" grpId="0" nodeType="withEffect">
                                   <p:stCondLst>
                                     <p:cond delay="0"/>
                                   </p:stCondLst>
                                   <p:childTnLst>
                                     <p:set>
                                       <p:cBhvr>
-                                        <p:cTn id="20" dur="1" fill="hold">
-                                          <p:stCondLst>
-                                            <p:cond delay="0"/>
-                                          </p:stCondLst>
-                                        </p:cTn>
-                                        <p:tgtEl>
-                                          <p:spTgt spid="21"/>
-                                        </p:tgtEl>
-                                        <p:attrNameLst>
-                                          <p:attrName>style.visibility</p:attrName>
-                                        </p:attrNameLst>
-                                      </p:cBhvr>
-                                      <p:to>
-                                        <p:strVal val="visible"/>
-                                      </p:to>
-                                    </p:set>
-                                    <p:animEffect transition="in" filter="fade">
-                                      <p:cBhvr>
-                                        <p:cTn id="21" dur="500"/>
-                                        <p:tgtEl>
-                                          <p:spTgt spid="21"/>
-                                        </p:tgtEl>
-                                      </p:cBhvr>
-                                    </p:animEffect>
-                                  </p:childTnLst>
-                                </p:cTn>
-                              </p:par>
-                              <p:par>
-                                <p:cTn id="22" presetID="10" presetClass="entr" presetSubtype="0" fill="hold" grpId="0" nodeType="withEffect">
-                                  <p:stCondLst>
-                                    <p:cond delay="0"/>
-                                  </p:stCondLst>
-                                  <p:childTnLst>
-                                    <p:set>
-                                      <p:cBhvr>
-                                        <p:cTn id="23" dur="1" fill="hold">
+                                        <p:cTn id="17" dur="1" fill="hold">
                                           <p:stCondLst>
                                             <p:cond delay="0"/>
                                           </p:stCondLst>
@@ -12462,7 +12392,7 @@
                                     </p:set>
                                     <p:animEffect transition="in" filter="fade">
                                       <p:cBhvr>
-                                        <p:cTn id="24" dur="500"/>
+                                        <p:cTn id="18" dur="500"/>
                                         <p:tgtEl>
                                           <p:spTgt spid="27"/>
                                         </p:tgtEl>
@@ -12472,14 +12402,137 @@
                                 </p:cTn>
                               </p:par>
                               <p:par>
-                                <p:cTn id="25" presetID="10" presetClass="entr" presetSubtype="0" fill="hold" grpId="0" nodeType="withEffect">
+                                <p:cTn id="19" presetID="10" presetClass="entr" presetSubtype="0" fill="hold" nodeType="withEffect">
                                   <p:stCondLst>
                                     <p:cond delay="0"/>
                                   </p:stCondLst>
                                   <p:childTnLst>
                                     <p:set>
                                       <p:cBhvr>
-                                        <p:cTn id="26" dur="1" fill="hold">
+                                        <p:cTn id="20" dur="1" fill="hold">
+                                          <p:stCondLst>
+                                            <p:cond delay="0"/>
+                                          </p:stCondLst>
+                                        </p:cTn>
+                                        <p:tgtEl>
+                                          <p:spTgt spid="23"/>
+                                        </p:tgtEl>
+                                        <p:attrNameLst>
+                                          <p:attrName>style.visibility</p:attrName>
+                                        </p:attrNameLst>
+                                      </p:cBhvr>
+                                      <p:to>
+                                        <p:strVal val="visible"/>
+                                      </p:to>
+                                    </p:set>
+                                    <p:animEffect transition="in" filter="fade">
+                                      <p:cBhvr>
+                                        <p:cTn id="21" dur="500"/>
+                                        <p:tgtEl>
+                                          <p:spTgt spid="23"/>
+                                        </p:tgtEl>
+                                      </p:cBhvr>
+                                    </p:animEffect>
+                                  </p:childTnLst>
+                                </p:cTn>
+                              </p:par>
+                            </p:childTnLst>
+                          </p:cTn>
+                        </p:par>
+                      </p:childTnLst>
+                    </p:cTn>
+                  </p:par>
+                  <p:par>
+                    <p:cTn id="22" fill="hold">
+                      <p:stCondLst>
+                        <p:cond delay="indefinite"/>
+                      </p:stCondLst>
+                      <p:childTnLst>
+                        <p:par>
+                          <p:cTn id="23" fill="hold">
+                            <p:stCondLst>
+                              <p:cond delay="0"/>
+                            </p:stCondLst>
+                            <p:childTnLst>
+                              <p:par>
+                                <p:cTn id="24" presetID="10" presetClass="entr" presetSubtype="0" fill="hold" grpId="0" nodeType="clickEffect">
+                                  <p:stCondLst>
+                                    <p:cond delay="0"/>
+                                  </p:stCondLst>
+                                  <p:childTnLst>
+                                    <p:set>
+                                      <p:cBhvr>
+                                        <p:cTn id="25" dur="1" fill="hold">
+                                          <p:stCondLst>
+                                            <p:cond delay="0"/>
+                                          </p:stCondLst>
+                                        </p:cTn>
+                                        <p:tgtEl>
+                                          <p:spTgt spid="31"/>
+                                        </p:tgtEl>
+                                        <p:attrNameLst>
+                                          <p:attrName>style.visibility</p:attrName>
+                                        </p:attrNameLst>
+                                      </p:cBhvr>
+                                      <p:to>
+                                        <p:strVal val="visible"/>
+                                      </p:to>
+                                    </p:set>
+                                    <p:animEffect transition="in" filter="fade">
+                                      <p:cBhvr>
+                                        <p:cTn id="26" dur="500"/>
+                                        <p:tgtEl>
+                                          <p:spTgt spid="31"/>
+                                        </p:tgtEl>
+                                      </p:cBhvr>
+                                    </p:animEffect>
+                                  </p:childTnLst>
+                                </p:cTn>
+                              </p:par>
+                              <p:par>
+                                <p:cTn id="27" presetID="10" presetClass="entr" presetSubtype="0" fill="hold" nodeType="withEffect">
+                                  <p:stCondLst>
+                                    <p:cond delay="0"/>
+                                  </p:stCondLst>
+                                  <p:childTnLst>
+                                    <p:set>
+                                      <p:cBhvr>
+                                        <p:cTn id="28" dur="1" fill="hold">
+                                          <p:stCondLst>
+                                            <p:cond delay="0"/>
+                                          </p:stCondLst>
+                                        </p:cTn>
+                                        <p:tgtEl>
+                                          <p:spTgt spid="25"/>
+                                        </p:tgtEl>
+                                        <p:attrNameLst>
+                                          <p:attrName>style.visibility</p:attrName>
+                                        </p:attrNameLst>
+                                      </p:cBhvr>
+                                      <p:to>
+                                        <p:strVal val="visible"/>
+                                      </p:to>
+                                    </p:set>
+                                    <p:animEffect transition="in" filter="fade">
+                                      <p:cBhvr>
+                                        <p:cTn id="29" dur="500"/>
+                                        <p:tgtEl>
+                                          <p:spTgt spid="25"/>
+                                        </p:tgtEl>
+                                      </p:cBhvr>
+                                    </p:animEffect>
+                                  </p:childTnLst>
+                                </p:cTn>
+                              </p:par>
+                              <p:par>
+                                <p:cTn id="30" presetID="10" presetClass="entr" presetSubtype="0" fill="hold" grpId="0" nodeType="withEffect">
+                                  <p:stCondLst>
+                                    <p:cond delay="0"/>
+                                  </p:stCondLst>
+                                  <p:childTnLst>
+                                    <p:set>
+                                      <p:cBhvr>
+                                        <p:cTn id="31" dur="1" fill="hold">
                                           <p:stCondLst>
                                             <p:cond delay="0"/>
                                           </p:stCondLst>
@@ -12497,7 +12550,7 @@
                                     </p:set>
                                     <p:animEffect transition="in" filter="fade">
                                       <p:cBhvr>
-                                        <p:cTn id="27" dur="500"/>
+                                        <p:cTn id="32" dur="500"/>
                                         <p:tgtEl>
                                           <p:spTgt spid="30"/>
                                         </p:tgtEl>
@@ -12534,10 +12587,11 @@
       </p:par>
     </p:tnLst>
     <p:bldLst>
-      <p:bldP spid="16" grpId="0" animBg="1"/>
       <p:bldP spid="21" grpId="0" animBg="1"/>
       <p:bldP spid="27" grpId="0" animBg="1"/>
       <p:bldP spid="30" grpId="0" animBg="1"/>
+      <p:bldP spid="6" grpId="0"/>
+      <p:bldP spid="31" grpId="0"/>
     </p:bldLst>
   </p:timing>
 </p:sld>
@@ -14384,7 +14438,7 @@
                             </p:stCondLst>
                             <p:childTnLst>
                               <p:par>
-                                <p:cTn id="5" presetID="10" presetClass="entr" presetSubtype="0" fill="hold" nodeType="clickEffect">
+                                <p:cTn id="5" presetID="10" presetClass="entr" presetSubtype="0" fill="hold" grpId="0" nodeType="clickEffect">
                                   <p:stCondLst>
                                     <p:cond delay="0"/>
                                   </p:stCondLst>
@@ -14397,7 +14451,7 @@
                                           </p:stCondLst>
                                         </p:cTn>
                                         <p:tgtEl>
-                                          <p:spTgt spid="15"/>
+                                          <p:spTgt spid="22"/>
                                         </p:tgtEl>
                                         <p:attrNameLst>
                                           <p:attrName>style.visibility</p:attrName>
@@ -14411,7 +14465,7 @@
                                       <p:cBhvr>
                                         <p:cTn id="7" dur="500"/>
                                         <p:tgtEl>
-                                          <p:spTgt spid="15"/>
+                                          <p:spTgt spid="22"/>
                                         </p:tgtEl>
                                       </p:cBhvr>
                                     </p:animEffect>
@@ -14419,7 +14473,7 @@
                                 </p:cTn>
                               </p:par>
                               <p:par>
-                                <p:cTn id="8" presetID="10" presetClass="entr" presetSubtype="0" fill="hold" grpId="0" nodeType="withEffect">
+                                <p:cTn id="8" presetID="10" presetClass="entr" presetSubtype="0" fill="hold" nodeType="withEffect">
                                   <p:stCondLst>
                                     <p:cond delay="0"/>
                                   </p:stCondLst>
@@ -14432,7 +14486,7 @@
                                           </p:stCondLst>
                                         </p:cTn>
                                         <p:tgtEl>
-                                          <p:spTgt spid="16"/>
+                                          <p:spTgt spid="19"/>
                                         </p:tgtEl>
                                         <p:attrNameLst>
                                           <p:attrName>style.visibility</p:attrName>
@@ -14446,60 +14500,7 @@
                                       <p:cBhvr>
                                         <p:cTn id="10" dur="500"/>
                                         <p:tgtEl>
-                                          <p:spTgt spid="16"/>
-                                        </p:tgtEl>
-                                      </p:cBhvr>
-                                    </p:animEffect>
-                                  </p:childTnLst>
-                                </p:cTn>
-                              </p:par>
-                            </p:childTnLst>
-                          </p:cTn>
-                        </p:par>
-                      </p:childTnLst>
-                    </p:cTn>
-                  </p:par>
-                  <p:par>
-                    <p:cTn id="11" fill="hold">
-                      <p:stCondLst>
-                        <p:cond delay="indefinite"/>
-                      </p:stCondLst>
-                      <p:childTnLst>
-                        <p:par>
-                          <p:cTn id="12" fill="hold">
-                            <p:stCondLst>
-                              <p:cond delay="0"/>
-                            </p:stCondLst>
-                            <p:childTnLst>
-                              <p:par>
-                                <p:cTn id="13" presetID="10" presetClass="entr" presetSubtype="0" fill="hold" nodeType="clickEffect">
-                                  <p:stCondLst>
-                                    <p:cond delay="0"/>
-                                  </p:stCondLst>
-                                  <p:childTnLst>
-                                    <p:set>
-                                      <p:cBhvr>
-                                        <p:cTn id="14" dur="1" fill="hold">
-                                          <p:stCondLst>
-                                            <p:cond delay="0"/>
-                                          </p:stCondLst>
-                                        </p:cTn>
-                                        <p:tgtEl>
-                                          <p:spTgt spid="20"/>
-                                        </p:tgtEl>
-                                        <p:attrNameLst>
-                                          <p:attrName>style.visibility</p:attrName>
-                                        </p:attrNameLst>
-                                      </p:cBhvr>
-                                      <p:to>
-                                        <p:strVal val="visible"/>
-                                      </p:to>
-                                    </p:set>
-                                    <p:animEffect transition="in" filter="fade">
-                                      <p:cBhvr>
-                                        <p:cTn id="15" dur="500"/>
-                                        <p:tgtEl>
-                                          <p:spTgt spid="20"/>
+                                          <p:spTgt spid="19"/>
                                         </p:tgtEl>
                                       </p:cBhvr>
                                     </p:animEffect>
@@ -14507,14 +14508,14 @@
                                 </p:cTn>
                               </p:par>
                               <p:par>
-                                <p:cTn id="16" presetID="10" presetClass="entr" presetSubtype="0" fill="hold" grpId="0" nodeType="withEffect">
+                                <p:cTn id="11" presetID="10" presetClass="entr" presetSubtype="0" fill="hold" grpId="0" nodeType="withEffect">
                                   <p:stCondLst>
                                     <p:cond delay="0"/>
                                   </p:stCondLst>
                                   <p:childTnLst>
                                     <p:set>
                                       <p:cBhvr>
-                                        <p:cTn id="17" dur="1" fill="hold">
+                                        <p:cTn id="12" dur="1" fill="hold">
                                           <p:stCondLst>
                                             <p:cond delay="0"/>
                                           </p:stCondLst>
@@ -14532,7 +14533,7 @@
                                     </p:set>
                                     <p:animEffect transition="in" filter="fade">
                                       <p:cBhvr>
-                                        <p:cTn id="18" dur="500"/>
+                                        <p:cTn id="13" dur="500"/>
                                         <p:tgtEl>
                                           <p:spTgt spid="21"/>
                                         </p:tgtEl>
@@ -14541,8 +14542,61 @@
                                   </p:childTnLst>
                                 </p:cTn>
                               </p:par>
+                            </p:childTnLst>
+                          </p:cTn>
+                        </p:par>
+                      </p:childTnLst>
+                    </p:cTn>
+                  </p:par>
+                  <p:par>
+                    <p:cTn id="14" fill="hold">
+                      <p:stCondLst>
+                        <p:cond delay="indefinite"/>
+                      </p:stCondLst>
+                      <p:childTnLst>
+                        <p:par>
+                          <p:cTn id="15" fill="hold">
+                            <p:stCondLst>
+                              <p:cond delay="0"/>
+                            </p:stCondLst>
+                            <p:childTnLst>
                               <p:par>
-                                <p:cTn id="19" presetID="10" presetClass="entr" presetSubtype="0" fill="hold" grpId="0" nodeType="withEffect">
+                                <p:cTn id="16" presetID="10" presetClass="entr" presetSubtype="0" fill="hold" grpId="0" nodeType="clickEffect">
+                                  <p:stCondLst>
+                                    <p:cond delay="0"/>
+                                  </p:stCondLst>
+                                  <p:childTnLst>
+                                    <p:set>
+                                      <p:cBhvr>
+                                        <p:cTn id="17" dur="1" fill="hold">
+                                          <p:stCondLst>
+                                            <p:cond delay="0"/>
+                                          </p:stCondLst>
+                                        </p:cTn>
+                                        <p:tgtEl>
+                                          <p:spTgt spid="6"/>
+                                        </p:tgtEl>
+                                        <p:attrNameLst>
+                                          <p:attrName>style.visibility</p:attrName>
+                                        </p:attrNameLst>
+                                      </p:cBhvr>
+                                      <p:to>
+                                        <p:strVal val="visible"/>
+                                      </p:to>
+                                    </p:set>
+                                    <p:animEffect transition="in" filter="fade">
+                                      <p:cBhvr>
+                                        <p:cTn id="18" dur="500"/>
+                                        <p:tgtEl>
+                                          <p:spTgt spid="6"/>
+                                        </p:tgtEl>
+                                      </p:cBhvr>
+                                    </p:animEffect>
+                                  </p:childTnLst>
+                                </p:cTn>
+                              </p:par>
+                              <p:par>
+                                <p:cTn id="19" presetID="10" presetClass="entr" presetSubtype="0" fill="hold" nodeType="withEffect">
                                   <p:stCondLst>
                                     <p:cond delay="0"/>
                                   </p:stCondLst>
@@ -14550,6 +14604,41 @@
                                     <p:set>
                                       <p:cBhvr>
                                         <p:cTn id="20" dur="1" fill="hold">
+                                          <p:stCondLst>
+                                            <p:cond delay="0"/>
+                                          </p:stCondLst>
+                                        </p:cTn>
+                                        <p:tgtEl>
+                                          <p:spTgt spid="24"/>
+                                        </p:tgtEl>
+                                        <p:attrNameLst>
+                                          <p:attrName>style.visibility</p:attrName>
+                                        </p:attrNameLst>
+                                      </p:cBhvr>
+                                      <p:to>
+                                        <p:strVal val="visible"/>
+                                      </p:to>
+                                    </p:set>
+                                    <p:animEffect transition="in" filter="fade">
+                                      <p:cBhvr>
+                                        <p:cTn id="21" dur="500"/>
+                                        <p:tgtEl>
+                                          <p:spTgt spid="24"/>
+                                        </p:tgtEl>
+                                      </p:cBhvr>
+                                    </p:animEffect>
+                                  </p:childTnLst>
+                                </p:cTn>
+                              </p:par>
+                              <p:par>
+                                <p:cTn id="22" presetID="10" presetClass="entr" presetSubtype="0" fill="hold" grpId="0" nodeType="withEffect">
+                                  <p:stCondLst>
+                                    <p:cond delay="0"/>
+                                  </p:stCondLst>
+                                  <p:childTnLst>
+                                    <p:set>
+                                      <p:cBhvr>
+                                        <p:cTn id="23" dur="1" fill="hold">
                                           <p:stCondLst>
                                             <p:cond delay="0"/>
                                           </p:stCondLst>
@@ -14567,7 +14656,7 @@
                                     </p:set>
                                     <p:animEffect transition="in" filter="fade">
                                       <p:cBhvr>
-                                        <p:cTn id="21" dur="500"/>
+                                        <p:cTn id="24" dur="500"/>
                                         <p:tgtEl>
                                           <p:spTgt spid="27"/>
                                         </p:tgtEl>
@@ -14583,32 +14672,32 @@
                     </p:cTn>
                   </p:par>
                   <p:par>
-                    <p:cTn id="22" fill="hold">
+                    <p:cTn id="25" fill="hold">
                       <p:stCondLst>
                         <p:cond delay="indefinite"/>
                       </p:stCondLst>
                       <p:childTnLst>
                         <p:par>
-                          <p:cTn id="23" fill="hold">
+                          <p:cTn id="26" fill="hold">
                             <p:stCondLst>
                               <p:cond delay="0"/>
                             </p:stCondLst>
                             <p:childTnLst>
                               <p:par>
-                                <p:cTn id="24" presetID="10" presetClass="entr" presetSubtype="0" fill="hold" nodeType="clickEffect">
+                                <p:cTn id="27" presetID="10" presetClass="entr" presetSubtype="0" fill="hold" grpId="0" nodeType="clickEffect">
                                   <p:stCondLst>
                                     <p:cond delay="0"/>
                                   </p:stCondLst>
                                   <p:childTnLst>
                                     <p:set>
                                       <p:cBhvr>
-                                        <p:cTn id="25" dur="1" fill="hold">
+                                        <p:cTn id="28" dur="1" fill="hold">
                                           <p:stCondLst>
                                             <p:cond delay="0"/>
                                           </p:stCondLst>
                                         </p:cTn>
                                         <p:tgtEl>
-                                          <p:spTgt spid="24"/>
+                                          <p:spTgt spid="28"/>
                                         </p:tgtEl>
                                         <p:attrNameLst>
                                           <p:attrName>style.visibility</p:attrName>
@@ -14620,9 +14709,44 @@
                                     </p:set>
                                     <p:animEffect transition="in" filter="fade">
                                       <p:cBhvr>
-                                        <p:cTn id="26" dur="500"/>
+                                        <p:cTn id="29" dur="500"/>
                                         <p:tgtEl>
-                                          <p:spTgt spid="24"/>
+                                          <p:spTgt spid="28"/>
+                                        </p:tgtEl>
+                                      </p:cBhvr>
+                                    </p:animEffect>
+                                  </p:childTnLst>
+                                </p:cTn>
+                              </p:par>
+                              <p:par>
+                                <p:cTn id="30" presetID="10" presetClass="entr" presetSubtype="0" fill="hold" nodeType="withEffect">
+                                  <p:stCondLst>
+                                    <p:cond delay="0"/>
+                                  </p:stCondLst>
+                                  <p:childTnLst>
+                                    <p:set>
+                                      <p:cBhvr>
+                                        <p:cTn id="31" dur="1" fill="hold">
+                                          <p:stCondLst>
+                                            <p:cond delay="0"/>
+                                          </p:stCondLst>
+                                        </p:cTn>
+                                        <p:tgtEl>
+                                          <p:spTgt spid="26"/>
+                                        </p:tgtEl>
+                                        <p:attrNameLst>
+                                          <p:attrName>style.visibility</p:attrName>
+                                        </p:attrNameLst>
+                                      </p:cBhvr>
+                                      <p:to>
+                                        <p:strVal val="visible"/>
+                                      </p:to>
+                                    </p:set>
+                                    <p:animEffect transition="in" filter="fade">
+                                      <p:cBhvr>
+                                        <p:cTn id="32" dur="500"/>
+                                        <p:tgtEl>
+                                          <p:spTgt spid="26"/>
                                         </p:tgtEl>
                                       </p:cBhvr>
                                     </p:animEffect>
@@ -14657,9 +14781,11 @@
       </p:par>
     </p:tnLst>
     <p:bldLst>
-      <p:bldP spid="16" grpId="0" animBg="1"/>
       <p:bldP spid="21" grpId="0" animBg="1"/>
       <p:bldP spid="27" grpId="0" animBg="1"/>
+      <p:bldP spid="6" grpId="0"/>
+      <p:bldP spid="22" grpId="0"/>
+      <p:bldP spid="28" grpId="0"/>
     </p:bldLst>
   </p:timing>
 </p:sld>
@@ -14773,7 +14899,7 @@
         </p:blipFill>
         <p:spPr bwMode="auto">
           <a:xfrm>
-            <a:off x="6135610" y="428875"/>
+            <a:off x="6135610" y="329786"/>
             <a:ext cx="4307988" cy="2538123"/>
           </a:xfrm>
           <a:prstGeom prst="rect">
@@ -15166,7 +15292,7 @@
         </p:nvSpPr>
         <p:spPr>
           <a:xfrm>
-            <a:off x="9136404" y="5649168"/>
+            <a:off x="9136404" y="5590616"/>
             <a:ext cx="1018125" cy="369332"/>
           </a:xfrm>
           <a:prstGeom prst="rect">
@@ -15215,7 +15341,7 @@
         </p:blipFill>
         <p:spPr>
           <a:xfrm>
-            <a:off x="8994362" y="2630694"/>
+            <a:off x="8994362" y="2572142"/>
             <a:ext cx="1389300" cy="1577249"/>
           </a:xfrm>
           <a:prstGeom prst="rect">
@@ -15250,7 +15376,7 @@
         </p:blipFill>
         <p:spPr>
           <a:xfrm>
-            <a:off x="9002558" y="4071919"/>
+            <a:off x="9002558" y="4013367"/>
             <a:ext cx="1389300" cy="1577249"/>
           </a:xfrm>
           <a:prstGeom prst="rect">
@@ -15660,8 +15786,136 @@
         </p:nvSpPr>
         <p:spPr>
           <a:xfrm rot="19906790">
-            <a:off x="10178202" y="4731288"/>
+            <a:off x="10178202" y="4672736"/>
             <a:ext cx="497125" cy="222637"/>
+          </a:xfrm>
+          <a:prstGeom prst="rightArrow">
+            <a:avLst/>
+          </a:prstGeom>
+          <a:solidFill>
+            <a:schemeClr val="bg2">
+              <a:lumMod val="50000"/>
+            </a:schemeClr>
+          </a:solidFill>
+          <a:ln>
+            <a:solidFill>
+              <a:schemeClr val="tx1"/>
+            </a:solidFill>
+          </a:ln>
+        </p:spPr>
+        <p:style>
+          <a:lnRef idx="2">
+            <a:schemeClr val="accent1">
+              <a:shade val="50000"/>
+            </a:schemeClr>
+          </a:lnRef>
+          <a:fillRef idx="1">
+            <a:schemeClr val="accent1"/>
+          </a:fillRef>
+          <a:effectRef idx="0">
+            <a:schemeClr val="accent1"/>
+          </a:effectRef>
+          <a:fontRef idx="minor">
+            <a:schemeClr val="lt1"/>
+          </a:fontRef>
+        </p:style>
+        <p:txBody>
+          <a:bodyPr rtlCol="0" anchor="ctr"/>
+          <a:lstStyle/>
+          <a:p>
+            <a:pPr algn="ctr"/>
+            <a:endParaRPr lang="en-US"/>
+          </a:p>
+        </p:txBody>
+      </p:sp>
+      <p:pic>
+        <p:nvPicPr>
+          <p:cNvPr id="4" name="Picture 3" descr="A picture containing text, stationary, businesscard, envelope&#10;&#10;Description automatically generated">
+            <a:extLst>
+              <a:ext uri="{FF2B5EF4-FFF2-40B4-BE49-F238E27FC236}">
+                <a16:creationId xmlns:a16="http://schemas.microsoft.com/office/drawing/2014/main" id="{97E91DF9-3347-40D4-93B5-9C6C871D4176}"/>
+              </a:ext>
+            </a:extLst>
+          </p:cNvPr>
+          <p:cNvPicPr>
+            <a:picLocks noChangeAspect="1"/>
+          </p:cNvPicPr>
+          <p:nvPr/>
+        </p:nvPicPr>
+        <p:blipFill>
+          <a:blip r:embed="rId9">
+            <a:extLst>
+              <a:ext uri="{28A0092B-C50C-407E-A947-70E740481C1C}">
+                <a14:useLocalDpi xmlns:a14="http://schemas.microsoft.com/office/drawing/2010/main" val="0"/>
+              </a:ext>
+            </a:extLst>
+          </a:blip>
+          <a:stretch>
+            <a:fillRect/>
+          </a:stretch>
+        </p:blipFill>
+        <p:spPr>
+          <a:xfrm>
+            <a:off x="5035523" y="1429887"/>
+            <a:ext cx="1228004" cy="1228004"/>
+          </a:xfrm>
+          <a:prstGeom prst="rect">
+            <a:avLst/>
+          </a:prstGeom>
+        </p:spPr>
+      </p:pic>
+      <p:sp>
+        <p:nvSpPr>
+          <p:cNvPr id="27" name="TextBox 26">
+            <a:extLst>
+              <a:ext uri="{FF2B5EF4-FFF2-40B4-BE49-F238E27FC236}">
+                <a16:creationId xmlns:a16="http://schemas.microsoft.com/office/drawing/2014/main" id="{F84753AD-B519-4014-88C1-386F9E212A05}"/>
+              </a:ext>
+            </a:extLst>
+          </p:cNvPr>
+          <p:cNvSpPr txBox="1"/>
+          <p:nvPr/>
+        </p:nvSpPr>
+        <p:spPr>
+          <a:xfrm>
+            <a:off x="5111325" y="2627102"/>
+            <a:ext cx="893108" cy="369332"/>
+          </a:xfrm>
+          <a:prstGeom prst="rect">
+            <a:avLst/>
+          </a:prstGeom>
+          <a:noFill/>
+        </p:spPr>
+        <p:txBody>
+          <a:bodyPr wrap="square" rtlCol="0">
+            <a:spAutoFit/>
+          </a:bodyPr>
+          <a:lstStyle/>
+          <a:p>
+            <a:pPr algn="ctr"/>
+            <a:r>
+              <a:rPr lang="en-US" dirty="0"/>
+              <a:t>SES</a:t>
+            </a:r>
+          </a:p>
+        </p:txBody>
+      </p:sp>
+      <p:sp>
+        <p:nvSpPr>
+          <p:cNvPr id="30" name="Arrow: Right 29">
+            <a:extLst>
+              <a:ext uri="{FF2B5EF4-FFF2-40B4-BE49-F238E27FC236}">
+                <a16:creationId xmlns:a16="http://schemas.microsoft.com/office/drawing/2014/main" id="{CF04807C-8068-4DAF-AA5A-9CDD2BBF1B79}"/>
+              </a:ext>
+            </a:extLst>
+          </p:cNvPr>
+          <p:cNvSpPr/>
+          <p:nvPr/>
+        </p:nvSpPr>
+        <p:spPr>
+          <a:xfrm rot="15082259">
+            <a:off x="5756247" y="3053864"/>
+            <a:ext cx="495669" cy="222637"/>
           </a:xfrm>
           <a:prstGeom prst="rightArrow">
             <a:avLst/>
@@ -15733,7 +15987,7 @@
                             </p:stCondLst>
                             <p:childTnLst>
                               <p:par>
-                                <p:cTn id="5" presetID="10" presetClass="entr" presetSubtype="0" fill="hold" nodeType="clickEffect">
+                                <p:cTn id="5" presetID="10" presetClass="entr" presetSubtype="0" fill="hold" grpId="0" nodeType="clickEffect">
                                   <p:stCondLst>
                                     <p:cond delay="0"/>
                                   </p:stCondLst>
@@ -15746,7 +16000,7 @@
                                           </p:stCondLst>
                                         </p:cTn>
                                         <p:tgtEl>
-                                          <p:spTgt spid="15"/>
+                                          <p:spTgt spid="21"/>
                                         </p:tgtEl>
                                         <p:attrNameLst>
                                           <p:attrName>style.visibility</p:attrName>
@@ -15760,7 +16014,7 @@
                                       <p:cBhvr>
                                         <p:cTn id="7" dur="500"/>
                                         <p:tgtEl>
-                                          <p:spTgt spid="15"/>
+                                          <p:spTgt spid="21"/>
                                         </p:tgtEl>
                                       </p:cBhvr>
                                     </p:animEffect>
@@ -15768,7 +16022,7 @@
                                 </p:cTn>
                               </p:par>
                               <p:par>
-                                <p:cTn id="8" presetID="10" presetClass="entr" presetSubtype="0" fill="hold" grpId="0" nodeType="withEffect">
+                                <p:cTn id="8" presetID="10" presetClass="entr" presetSubtype="0" fill="hold" nodeType="withEffect">
                                   <p:stCondLst>
                                     <p:cond delay="0"/>
                                   </p:stCondLst>
@@ -15776,41 +16030,6 @@
                                     <p:set>
                                       <p:cBhvr>
                                         <p:cTn id="9" dur="1" fill="hold">
-                                          <p:stCondLst>
-                                            <p:cond delay="0"/>
-                                          </p:stCondLst>
-                                        </p:cTn>
-                                        <p:tgtEl>
-                                          <p:spTgt spid="16"/>
-                                        </p:tgtEl>
-                                        <p:attrNameLst>
-                                          <p:attrName>style.visibility</p:attrName>
-                                        </p:attrNameLst>
-                                      </p:cBhvr>
-                                      <p:to>
-                                        <p:strVal val="visible"/>
-                                      </p:to>
-                                    </p:set>
-                                    <p:animEffect transition="in" filter="fade">
-                                      <p:cBhvr>
-                                        <p:cTn id="10" dur="500"/>
-                                        <p:tgtEl>
-                                          <p:spTgt spid="16"/>
-                                        </p:tgtEl>
-                                      </p:cBhvr>
-                                    </p:animEffect>
-                                  </p:childTnLst>
-                                </p:cTn>
-                              </p:par>
-                              <p:par>
-                                <p:cTn id="11" presetID="10" presetClass="entr" presetSubtype="0" fill="hold" nodeType="withEffect">
-                                  <p:stCondLst>
-                                    <p:cond delay="0"/>
-                                  </p:stCondLst>
-                                  <p:childTnLst>
-                                    <p:set>
-                                      <p:cBhvr>
-                                        <p:cTn id="12" dur="1" fill="hold">
                                           <p:stCondLst>
                                             <p:cond delay="0"/>
                                           </p:stCondLst>
@@ -15828,7 +16047,7 @@
                                     </p:set>
                                     <p:animEffect transition="in" filter="fade">
                                       <p:cBhvr>
-                                        <p:cTn id="13" dur="500"/>
+                                        <p:cTn id="10" dur="500"/>
                                         <p:tgtEl>
                                           <p:spTgt spid="17"/>
                                         </p:tgtEl>
@@ -15844,19 +16063,54 @@
                     </p:cTn>
                   </p:par>
                   <p:par>
-                    <p:cTn id="14" fill="hold">
+                    <p:cTn id="11" fill="hold">
                       <p:stCondLst>
                         <p:cond delay="indefinite"/>
                       </p:stCondLst>
                       <p:childTnLst>
                         <p:par>
-                          <p:cTn id="15" fill="hold">
+                          <p:cTn id="12" fill="hold">
                             <p:stCondLst>
                               <p:cond delay="0"/>
                             </p:stCondLst>
                             <p:childTnLst>
                               <p:par>
-                                <p:cTn id="16" presetID="10" presetClass="entr" presetSubtype="0" fill="hold" nodeType="clickEffect">
+                                <p:cTn id="13" presetID="10" presetClass="entr" presetSubtype="0" fill="hold" grpId="0" nodeType="clickEffect">
+                                  <p:stCondLst>
+                                    <p:cond delay="0"/>
+                                  </p:stCondLst>
+                                  <p:childTnLst>
+                                    <p:set>
+                                      <p:cBhvr>
+                                        <p:cTn id="14" dur="1" fill="hold">
+                                          <p:stCondLst>
+                                            <p:cond delay="0"/>
+                                          </p:stCondLst>
+                                        </p:cTn>
+                                        <p:tgtEl>
+                                          <p:spTgt spid="2"/>
+                                        </p:tgtEl>
+                                        <p:attrNameLst>
+                                          <p:attrName>style.visibility</p:attrName>
+                                        </p:attrNameLst>
+                                      </p:cBhvr>
+                                      <p:to>
+                                        <p:strVal val="visible"/>
+                                      </p:to>
+                                    </p:set>
+                                    <p:animEffect transition="in" filter="fade">
+                                      <p:cBhvr>
+                                        <p:cTn id="15" dur="500"/>
+                                        <p:tgtEl>
+                                          <p:spTgt spid="2"/>
+                                        </p:tgtEl>
+                                      </p:cBhvr>
+                                    </p:animEffect>
+                                  </p:childTnLst>
+                                </p:cTn>
+                              </p:par>
+                              <p:par>
+                                <p:cTn id="16" presetID="10" presetClass="entr" presetSubtype="0" fill="hold" nodeType="withEffect">
                                   <p:stCondLst>
                                     <p:cond delay="0"/>
                                   </p:stCondLst>
@@ -15869,7 +16123,7 @@
                                           </p:stCondLst>
                                         </p:cTn>
                                         <p:tgtEl>
-                                          <p:spTgt spid="20"/>
+                                          <p:spTgt spid="19"/>
                                         </p:tgtEl>
                                         <p:attrNameLst>
                                           <p:attrName>style.visibility</p:attrName>
@@ -15883,7 +16137,7 @@
                                       <p:cBhvr>
                                         <p:cTn id="18" dur="500"/>
                                         <p:tgtEl>
-                                          <p:spTgt spid="20"/>
+                                          <p:spTgt spid="19"/>
                                         </p:tgtEl>
                                       </p:cBhvr>
                                     </p:animEffect>
@@ -15904,7 +16158,7 @@
                                           </p:stCondLst>
                                         </p:cTn>
                                         <p:tgtEl>
-                                          <p:spTgt spid="21"/>
+                                          <p:spTgt spid="32"/>
                                         </p:tgtEl>
                                         <p:attrNameLst>
                                           <p:attrName>style.visibility</p:attrName>
@@ -15918,7 +16172,60 @@
                                       <p:cBhvr>
                                         <p:cTn id="21" dur="500"/>
                                         <p:tgtEl>
-                                          <p:spTgt spid="21"/>
+                                          <p:spTgt spid="32"/>
+                                        </p:tgtEl>
+                                      </p:cBhvr>
+                                    </p:animEffect>
+                                  </p:childTnLst>
+                                </p:cTn>
+                              </p:par>
+                            </p:childTnLst>
+                          </p:cTn>
+                        </p:par>
+                      </p:childTnLst>
+                    </p:cTn>
+                  </p:par>
+                  <p:par>
+                    <p:cTn id="22" fill="hold">
+                      <p:stCondLst>
+                        <p:cond delay="indefinite"/>
+                      </p:stCondLst>
+                      <p:childTnLst>
+                        <p:par>
+                          <p:cTn id="23" fill="hold">
+                            <p:stCondLst>
+                              <p:cond delay="0"/>
+                            </p:stCondLst>
+                            <p:childTnLst>
+                              <p:par>
+                                <p:cTn id="24" presetID="10" presetClass="entr" presetSubtype="0" fill="hold" grpId="0" nodeType="clickEffect">
+                                  <p:stCondLst>
+                                    <p:cond delay="0"/>
+                                  </p:stCondLst>
+                                  <p:childTnLst>
+                                    <p:set>
+                                      <p:cBhvr>
+                                        <p:cTn id="25" dur="1" fill="hold">
+                                          <p:stCondLst>
+                                            <p:cond delay="0"/>
+                                          </p:stCondLst>
+                                        </p:cTn>
+                                        <p:tgtEl>
+                                          <p:spTgt spid="30"/>
+                                        </p:tgtEl>
+                                        <p:attrNameLst>
+                                          <p:attrName>style.visibility</p:attrName>
+                                        </p:attrNameLst>
+                                      </p:cBhvr>
+                                      <p:to>
+                                        <p:strVal val="visible"/>
+                                      </p:to>
+                                    </p:set>
+                                    <p:animEffect transition="in" filter="fade">
+                                      <p:cBhvr>
+                                        <p:cTn id="26" dur="500"/>
+                                        <p:tgtEl>
+                                          <p:spTgt spid="30"/>
                                         </p:tgtEl>
                                       </p:cBhvr>
                                     </p:animEffect>
@@ -15926,14 +16233,277 @@
                                 </p:cTn>
                               </p:par>
                               <p:par>
-                                <p:cTn id="22" presetID="10" presetClass="entr" presetSubtype="0" fill="hold" nodeType="withEffect">
+                                <p:cTn id="27" presetID="10" presetClass="entr" presetSubtype="0" fill="hold" grpId="0" nodeType="withEffect">
                                   <p:stCondLst>
                                     <p:cond delay="0"/>
                                   </p:stCondLst>
                                   <p:childTnLst>
                                     <p:set>
                                       <p:cBhvr>
-                                        <p:cTn id="23" dur="1" fill="hold">
+                                        <p:cTn id="28" dur="1" fill="hold">
+                                          <p:stCondLst>
+                                            <p:cond delay="0"/>
+                                          </p:stCondLst>
+                                        </p:cTn>
+                                        <p:tgtEl>
+                                          <p:spTgt spid="27"/>
+                                        </p:tgtEl>
+                                        <p:attrNameLst>
+                                          <p:attrName>style.visibility</p:attrName>
+                                        </p:attrNameLst>
+                                      </p:cBhvr>
+                                      <p:to>
+                                        <p:strVal val="visible"/>
+                                      </p:to>
+                                    </p:set>
+                                    <p:animEffect transition="in" filter="fade">
+                                      <p:cBhvr>
+                                        <p:cTn id="29" dur="500"/>
+                                        <p:tgtEl>
+                                          <p:spTgt spid="27"/>
+                                        </p:tgtEl>
+                                      </p:cBhvr>
+                                    </p:animEffect>
+                                  </p:childTnLst>
+                                </p:cTn>
+                              </p:par>
+                              <p:par>
+                                <p:cTn id="30" presetID="10" presetClass="entr" presetSubtype="0" fill="hold" nodeType="withEffect">
+                                  <p:stCondLst>
+                                    <p:cond delay="0"/>
+                                  </p:stCondLst>
+                                  <p:childTnLst>
+                                    <p:set>
+                                      <p:cBhvr>
+                                        <p:cTn id="31" dur="1" fill="hold">
+                                          <p:stCondLst>
+                                            <p:cond delay="0"/>
+                                          </p:stCondLst>
+                                        </p:cTn>
+                                        <p:tgtEl>
+                                          <p:spTgt spid="4"/>
+                                        </p:tgtEl>
+                                        <p:attrNameLst>
+                                          <p:attrName>style.visibility</p:attrName>
+                                        </p:attrNameLst>
+                                      </p:cBhvr>
+                                      <p:to>
+                                        <p:strVal val="visible"/>
+                                      </p:to>
+                                    </p:set>
+                                    <p:animEffect transition="in" filter="fade">
+                                      <p:cBhvr>
+                                        <p:cTn id="32" dur="500"/>
+                                        <p:tgtEl>
+                                          <p:spTgt spid="4"/>
+                                        </p:tgtEl>
+                                      </p:cBhvr>
+                                    </p:animEffect>
+                                  </p:childTnLst>
+                                </p:cTn>
+                              </p:par>
+                              <p:par>
+                                <p:cTn id="33" presetID="10" presetClass="entr" presetSubtype="0" fill="hold" grpId="0" nodeType="withEffect">
+                                  <p:stCondLst>
+                                    <p:cond delay="0"/>
+                                  </p:stCondLst>
+                                  <p:childTnLst>
+                                    <p:set>
+                                      <p:cBhvr>
+                                        <p:cTn id="34" dur="1" fill="hold">
+                                          <p:stCondLst>
+                                            <p:cond delay="0"/>
+                                          </p:stCondLst>
+                                        </p:cTn>
+                                        <p:tgtEl>
+                                          <p:spTgt spid="33"/>
+                                        </p:tgtEl>
+                                        <p:attrNameLst>
+                                          <p:attrName>style.visibility</p:attrName>
+                                        </p:attrNameLst>
+                                      </p:cBhvr>
+                                      <p:to>
+                                        <p:strVal val="visible"/>
+                                      </p:to>
+                                    </p:set>
+                                    <p:animEffect transition="in" filter="fade">
+                                      <p:cBhvr>
+                                        <p:cTn id="35" dur="500"/>
+                                        <p:tgtEl>
+                                          <p:spTgt spid="33"/>
+                                        </p:tgtEl>
+                                      </p:cBhvr>
+                                    </p:animEffect>
+                                  </p:childTnLst>
+                                </p:cTn>
+                              </p:par>
+                              <p:par>
+                                <p:cTn id="36" presetID="10" presetClass="entr" presetSubtype="0" fill="hold" nodeType="withEffect">
+                                  <p:stCondLst>
+                                    <p:cond delay="0"/>
+                                  </p:stCondLst>
+                                  <p:childTnLst>
+                                    <p:set>
+                                      <p:cBhvr>
+                                        <p:cTn id="37" dur="1" fill="hold">
+                                          <p:stCondLst>
+                                            <p:cond delay="0"/>
+                                          </p:stCondLst>
+                                        </p:cTn>
+                                        <p:tgtEl>
+                                          <p:spTgt spid="22"/>
+                                        </p:tgtEl>
+                                        <p:attrNameLst>
+                                          <p:attrName>style.visibility</p:attrName>
+                                        </p:attrNameLst>
+                                      </p:cBhvr>
+                                      <p:to>
+                                        <p:strVal val="visible"/>
+                                      </p:to>
+                                    </p:set>
+                                    <p:animEffect transition="in" filter="fade">
+                                      <p:cBhvr>
+                                        <p:cTn id="38" dur="500"/>
+                                        <p:tgtEl>
+                                          <p:spTgt spid="22"/>
+                                        </p:tgtEl>
+                                      </p:cBhvr>
+                                    </p:animEffect>
+                                  </p:childTnLst>
+                                </p:cTn>
+                              </p:par>
+                              <p:par>
+                                <p:cTn id="39" presetID="10" presetClass="entr" presetSubtype="0" fill="hold" grpId="0" nodeType="withEffect">
+                                  <p:stCondLst>
+                                    <p:cond delay="0"/>
+                                  </p:stCondLst>
+                                  <p:childTnLst>
+                                    <p:set>
+                                      <p:cBhvr>
+                                        <p:cTn id="40" dur="1" fill="hold">
+                                          <p:stCondLst>
+                                            <p:cond delay="0"/>
+                                          </p:stCondLst>
+                                        </p:cTn>
+                                        <p:tgtEl>
+                                          <p:spTgt spid="37"/>
+                                        </p:tgtEl>
+                                        <p:attrNameLst>
+                                          <p:attrName>style.visibility</p:attrName>
+                                        </p:attrNameLst>
+                                      </p:cBhvr>
+                                      <p:to>
+                                        <p:strVal val="visible"/>
+                                      </p:to>
+                                    </p:set>
+                                    <p:animEffect transition="in" filter="fade">
+                                      <p:cBhvr>
+                                        <p:cTn id="41" dur="500"/>
+                                        <p:tgtEl>
+                                          <p:spTgt spid="37"/>
+                                        </p:tgtEl>
+                                      </p:cBhvr>
+                                    </p:animEffect>
+                                  </p:childTnLst>
+                                </p:cTn>
+                              </p:par>
+                            </p:childTnLst>
+                          </p:cTn>
+                        </p:par>
+                      </p:childTnLst>
+                    </p:cTn>
+                  </p:par>
+                  <p:par>
+                    <p:cTn id="42" fill="hold">
+                      <p:stCondLst>
+                        <p:cond delay="indefinite"/>
+                      </p:stCondLst>
+                      <p:childTnLst>
+                        <p:par>
+                          <p:cTn id="43" fill="hold">
+                            <p:stCondLst>
+                              <p:cond delay="0"/>
+                            </p:stCondLst>
+                            <p:childTnLst>
+                              <p:par>
+                                <p:cTn id="44" presetID="10" presetClass="entr" presetSubtype="0" fill="hold" grpId="0" nodeType="clickEffect">
+                                  <p:stCondLst>
+                                    <p:cond delay="0"/>
+                                  </p:stCondLst>
+                                  <p:childTnLst>
+                                    <p:set>
+                                      <p:cBhvr>
+                                        <p:cTn id="45" dur="1" fill="hold">
+                                          <p:stCondLst>
+                                            <p:cond delay="0"/>
+                                          </p:stCondLst>
+                                        </p:cTn>
+                                        <p:tgtEl>
+                                          <p:spTgt spid="34"/>
+                                        </p:tgtEl>
+                                        <p:attrNameLst>
+                                          <p:attrName>style.visibility</p:attrName>
+                                        </p:attrNameLst>
+                                      </p:cBhvr>
+                                      <p:to>
+                                        <p:strVal val="visible"/>
+                                      </p:to>
+                                    </p:set>
+                                    <p:animEffect transition="in" filter="fade">
+                                      <p:cBhvr>
+                                        <p:cTn id="46" dur="500"/>
+                                        <p:tgtEl>
+                                          <p:spTgt spid="34"/>
+                                        </p:tgtEl>
+                                      </p:cBhvr>
+                                    </p:animEffect>
+                                  </p:childTnLst>
+                                </p:cTn>
+                              </p:par>
+                              <p:par>
+                                <p:cTn id="47" presetID="10" presetClass="entr" presetSubtype="0" fill="hold" grpId="0" nodeType="withEffect">
+                                  <p:stCondLst>
+                                    <p:cond delay="0"/>
+                                  </p:stCondLst>
+                                  <p:childTnLst>
+                                    <p:set>
+                                      <p:cBhvr>
+                                        <p:cTn id="48" dur="1" fill="hold">
+                                          <p:stCondLst>
+                                            <p:cond delay="0"/>
+                                          </p:stCondLst>
+                                        </p:cTn>
+                                        <p:tgtEl>
+                                          <p:spTgt spid="35"/>
+                                        </p:tgtEl>
+                                        <p:attrNameLst>
+                                          <p:attrName>style.visibility</p:attrName>
+                                        </p:attrNameLst>
+                                      </p:cBhvr>
+                                      <p:to>
+                                        <p:strVal val="visible"/>
+                                      </p:to>
+                                    </p:set>
+                                    <p:animEffect transition="in" filter="fade">
+                                      <p:cBhvr>
+                                        <p:cTn id="49" dur="500"/>
+                                        <p:tgtEl>
+                                          <p:spTgt spid="35"/>
+                                        </p:tgtEl>
+                                      </p:cBhvr>
+                                    </p:animEffect>
+                                  </p:childTnLst>
+                                </p:cTn>
+                              </p:par>
+                              <p:par>
+                                <p:cTn id="50" presetID="10" presetClass="entr" presetSubtype="0" fill="hold" nodeType="withEffect">
+                                  <p:stCondLst>
+                                    <p:cond delay="0"/>
+                                  </p:stCondLst>
+                                  <p:childTnLst>
+                                    <p:set>
+                                      <p:cBhvr>
+                                        <p:cTn id="51" dur="1" fill="hold">
                                           <p:stCondLst>
                                             <p:cond delay="0"/>
                                           </p:stCondLst>
@@ -15951,7 +16521,7 @@
                                     </p:set>
                                     <p:animEffect transition="in" filter="fade">
                                       <p:cBhvr>
-                                        <p:cTn id="24" dur="500"/>
+                                        <p:cTn id="52" dur="500"/>
                                         <p:tgtEl>
                                           <p:spTgt spid="26"/>
                                         </p:tgtEl>
@@ -15961,14 +16531,14 @@
                                 </p:cTn>
                               </p:par>
                               <p:par>
-                                <p:cTn id="25" presetID="10" presetClass="entr" presetSubtype="0" fill="hold" nodeType="withEffect">
+                                <p:cTn id="53" presetID="10" presetClass="entr" presetSubtype="0" fill="hold" nodeType="withEffect">
                                   <p:stCondLst>
                                     <p:cond delay="0"/>
                                   </p:stCondLst>
                                   <p:childTnLst>
                                     <p:set>
                                       <p:cBhvr>
-                                        <p:cTn id="26" dur="1" fill="hold">
+                                        <p:cTn id="54" dur="1" fill="hold">
                                           <p:stCondLst>
                                             <p:cond delay="0"/>
                                           </p:stCondLst>
@@ -15986,7 +16556,7 @@
                                     </p:set>
                                     <p:animEffect transition="in" filter="fade">
                                       <p:cBhvr>
-                                        <p:cTn id="27" dur="500"/>
+                                        <p:cTn id="55" dur="500"/>
                                         <p:tgtEl>
                                           <p:spTgt spid="28"/>
                                         </p:tgtEl>
@@ -15996,20 +16566,20 @@
                                 </p:cTn>
                               </p:par>
                               <p:par>
-                                <p:cTn id="28" presetID="10" presetClass="entr" presetSubtype="0" fill="hold" grpId="0" nodeType="withEffect">
+                                <p:cTn id="56" presetID="10" presetClass="entr" presetSubtype="0" fill="hold" grpId="0" nodeType="withEffect">
                                   <p:stCondLst>
                                     <p:cond delay="0"/>
                                   </p:stCondLst>
                                   <p:childTnLst>
                                     <p:set>
                                       <p:cBhvr>
-                                        <p:cTn id="29" dur="1" fill="hold">
+                                        <p:cTn id="57" dur="1" fill="hold">
                                           <p:stCondLst>
                                             <p:cond delay="0"/>
                                           </p:stCondLst>
                                         </p:cTn>
                                         <p:tgtEl>
-                                          <p:spTgt spid="32"/>
+                                          <p:spTgt spid="24"/>
                                         </p:tgtEl>
                                         <p:attrNameLst>
                                           <p:attrName>style.visibility</p:attrName>
@@ -16021,129 +16591,42 @@
                                     </p:set>
                                     <p:animEffect transition="in" filter="fade">
                                       <p:cBhvr>
-                                        <p:cTn id="30" dur="500"/>
+                                        <p:cTn id="58" dur="500"/>
                                         <p:tgtEl>
-                                          <p:spTgt spid="32"/>
+                                          <p:spTgt spid="24"/>
                                         </p:tgtEl>
                                       </p:cBhvr>
                                     </p:animEffect>
                                   </p:childTnLst>
                                 </p:cTn>
                               </p:par>
+                            </p:childTnLst>
+                          </p:cTn>
+                        </p:par>
+                      </p:childTnLst>
+                    </p:cTn>
+                  </p:par>
+                  <p:par>
+                    <p:cTn id="59" fill="hold">
+                      <p:stCondLst>
+                        <p:cond delay="indefinite"/>
+                      </p:stCondLst>
+                      <p:childTnLst>
+                        <p:par>
+                          <p:cTn id="60" fill="hold">
+                            <p:stCondLst>
+                              <p:cond delay="0"/>
+                            </p:stCondLst>
+                            <p:childTnLst>
                               <p:par>
-                                <p:cTn id="31" presetID="10" presetClass="entr" presetSubtype="0" fill="hold" grpId="0" nodeType="withEffect">
+                                <p:cTn id="61" presetID="10" presetClass="entr" presetSubtype="0" fill="hold" grpId="0" nodeType="clickEffect">
                                   <p:stCondLst>
                                     <p:cond delay="0"/>
                                   </p:stCondLst>
                                   <p:childTnLst>
                                     <p:set>
                                       <p:cBhvr>
-                                        <p:cTn id="32" dur="1" fill="hold">
-                                          <p:stCondLst>
-                                            <p:cond delay="0"/>
-                                          </p:stCondLst>
-                                        </p:cTn>
-                                        <p:tgtEl>
-                                          <p:spTgt spid="33"/>
-                                        </p:tgtEl>
-                                        <p:attrNameLst>
-                                          <p:attrName>style.visibility</p:attrName>
-                                        </p:attrNameLst>
-                                      </p:cBhvr>
-                                      <p:to>
-                                        <p:strVal val="visible"/>
-                                      </p:to>
-                                    </p:set>
-                                    <p:animEffect transition="in" filter="fade">
-                                      <p:cBhvr>
-                                        <p:cTn id="33" dur="500"/>
-                                        <p:tgtEl>
-                                          <p:spTgt spid="33"/>
-                                        </p:tgtEl>
-                                      </p:cBhvr>
-                                    </p:animEffect>
-                                  </p:childTnLst>
-                                </p:cTn>
-                              </p:par>
-                              <p:par>
-                                <p:cTn id="34" presetID="10" presetClass="entr" presetSubtype="0" fill="hold" grpId="0" nodeType="withEffect">
-                                  <p:stCondLst>
-                                    <p:cond delay="0"/>
-                                  </p:stCondLst>
-                                  <p:childTnLst>
-                                    <p:set>
-                                      <p:cBhvr>
-                                        <p:cTn id="35" dur="1" fill="hold">
-                                          <p:stCondLst>
-                                            <p:cond delay="0"/>
-                                          </p:stCondLst>
-                                        </p:cTn>
-                                        <p:tgtEl>
-                                          <p:spTgt spid="34"/>
-                                        </p:tgtEl>
-                                        <p:attrNameLst>
-                                          <p:attrName>style.visibility</p:attrName>
-                                        </p:attrNameLst>
-                                      </p:cBhvr>
-                                      <p:to>
-                                        <p:strVal val="visible"/>
-                                      </p:to>
-                                    </p:set>
-                                    <p:animEffect transition="in" filter="fade">
-                                      <p:cBhvr>
-                                        <p:cTn id="36" dur="500"/>
-                                        <p:tgtEl>
-                                          <p:spTgt spid="34"/>
-                                        </p:tgtEl>
-                                      </p:cBhvr>
-                                    </p:animEffect>
-                                  </p:childTnLst>
-                                </p:cTn>
-                              </p:par>
-                              <p:par>
-                                <p:cTn id="37" presetID="10" presetClass="entr" presetSubtype="0" fill="hold" grpId="0" nodeType="withEffect">
-                                  <p:stCondLst>
-                                    <p:cond delay="0"/>
-                                  </p:stCondLst>
-                                  <p:childTnLst>
-                                    <p:set>
-                                      <p:cBhvr>
-                                        <p:cTn id="38" dur="1" fill="hold">
-                                          <p:stCondLst>
-                                            <p:cond delay="0"/>
-                                          </p:stCondLst>
-                                        </p:cTn>
-                                        <p:tgtEl>
-                                          <p:spTgt spid="35"/>
-                                        </p:tgtEl>
-                                        <p:attrNameLst>
-                                          <p:attrName>style.visibility</p:attrName>
-                                        </p:attrNameLst>
-                                      </p:cBhvr>
-                                      <p:to>
-                                        <p:strVal val="visible"/>
-                                      </p:to>
-                                    </p:set>
-                                    <p:animEffect transition="in" filter="fade">
-                                      <p:cBhvr>
-                                        <p:cTn id="39" dur="500"/>
-                                        <p:tgtEl>
-                                          <p:spTgt spid="35"/>
-                                        </p:tgtEl>
-                                      </p:cBhvr>
-                                    </p:animEffect>
-                                  </p:childTnLst>
-                                </p:cTn>
-                              </p:par>
-                              <p:par>
-                                <p:cTn id="40" presetID="10" presetClass="entr" presetSubtype="0" fill="hold" grpId="0" nodeType="withEffect">
-                                  <p:stCondLst>
-                                    <p:cond delay="0"/>
-                                  </p:stCondLst>
-                                  <p:childTnLst>
-                                    <p:set>
-                                      <p:cBhvr>
-                                        <p:cTn id="41" dur="1" fill="hold">
+                                        <p:cTn id="62" dur="1" fill="hold">
                                           <p:stCondLst>
                                             <p:cond delay="0"/>
                                           </p:stCondLst>
@@ -16161,7 +16644,7 @@
                                     </p:set>
                                     <p:animEffect transition="in" filter="fade">
                                       <p:cBhvr>
-                                        <p:cTn id="42" dur="500"/>
+                                        <p:cTn id="63" dur="500"/>
                                         <p:tgtEl>
                                           <p:spTgt spid="38"/>
                                         </p:tgtEl>
@@ -16171,14 +16654,14 @@
                                 </p:cTn>
                               </p:par>
                               <p:par>
-                                <p:cTn id="43" presetID="10" presetClass="entr" presetSubtype="0" fill="hold" grpId="0" nodeType="withEffect">
+                                <p:cTn id="64" presetID="10" presetClass="entr" presetSubtype="0" fill="hold" grpId="0" nodeType="withEffect">
                                   <p:stCondLst>
                                     <p:cond delay="0"/>
                                   </p:stCondLst>
                                   <p:childTnLst>
                                     <p:set>
                                       <p:cBhvr>
-                                        <p:cTn id="44" dur="1" fill="hold">
+                                        <p:cTn id="65" dur="1" fill="hold">
                                           <p:stCondLst>
                                             <p:cond delay="0"/>
                                           </p:stCondLst>
@@ -16196,9 +16679,79 @@
                                     </p:set>
                                     <p:animEffect transition="in" filter="fade">
                                       <p:cBhvr>
-                                        <p:cTn id="45" dur="500"/>
+                                        <p:cTn id="66" dur="500"/>
                                         <p:tgtEl>
                                           <p:spTgt spid="39"/>
+                                        </p:tgtEl>
+                                      </p:cBhvr>
+                                    </p:animEffect>
+                                  </p:childTnLst>
+                                </p:cTn>
+                              </p:par>
+                              <p:par>
+                                <p:cTn id="67" presetID="10" presetClass="entr" presetSubtype="0" fill="hold" grpId="0" nodeType="withEffect">
+                                  <p:stCondLst>
+                                    <p:cond delay="0"/>
+                                  </p:stCondLst>
+                                  <p:childTnLst>
+                                    <p:set>
+                                      <p:cBhvr>
+                                        <p:cTn id="68" dur="1" fill="hold">
+                                          <p:stCondLst>
+                                            <p:cond delay="0"/>
+                                          </p:stCondLst>
+                                        </p:cTn>
+                                        <p:tgtEl>
+                                          <p:spTgt spid="36"/>
+                                        </p:tgtEl>
+                                        <p:attrNameLst>
+                                          <p:attrName>style.visibility</p:attrName>
+                                        </p:attrNameLst>
+                                      </p:cBhvr>
+                                      <p:to>
+                                        <p:strVal val="visible"/>
+                                      </p:to>
+                                    </p:set>
+                                    <p:animEffect transition="in" filter="fade">
+                                      <p:cBhvr>
+                                        <p:cTn id="69" dur="500"/>
+                                        <p:tgtEl>
+                                          <p:spTgt spid="36"/>
+                                        </p:tgtEl>
+                                      </p:cBhvr>
+                                    </p:animEffect>
+                                  </p:childTnLst>
+                                </p:cTn>
+                              </p:par>
+                              <p:par>
+                                <p:cTn id="70" presetID="10" presetClass="entr" presetSubtype="0" fill="hold" nodeType="withEffect">
+                                  <p:stCondLst>
+                                    <p:cond delay="0"/>
+                                  </p:stCondLst>
+                                  <p:childTnLst>
+                                    <p:set>
+                                      <p:cBhvr>
+                                        <p:cTn id="71" dur="1" fill="hold">
+                                          <p:stCondLst>
+                                            <p:cond delay="0"/>
+                                          </p:stCondLst>
+                                        </p:cTn>
+                                        <p:tgtEl>
+                                          <p:spTgt spid="29"/>
+                                        </p:tgtEl>
+                                        <p:attrNameLst>
+                                          <p:attrName>style.visibility</p:attrName>
+                                        </p:attrNameLst>
+                                      </p:cBhvr>
+                                      <p:to>
+                                        <p:strVal val="visible"/>
+                                      </p:to>
+                                    </p:set>
+                                    <p:animEffect transition="in" filter="fade">
+                                      <p:cBhvr>
+                                        <p:cTn id="72" dur="500"/>
+                                        <p:tgtEl>
+                                          <p:spTgt spid="29"/>
                                         </p:tgtEl>
                                       </p:cBhvr>
                                     </p:animEffect>
@@ -16233,14 +16786,19 @@
       </p:par>
     </p:tnLst>
     <p:bldLst>
-      <p:bldP spid="16" grpId="0" animBg="1"/>
       <p:bldP spid="21" grpId="0" animBg="1"/>
+      <p:bldP spid="2" grpId="0"/>
+      <p:bldP spid="24" grpId="0"/>
       <p:bldP spid="32" grpId="0" animBg="1"/>
       <p:bldP spid="33" grpId="0" animBg="1"/>
       <p:bldP spid="34" grpId="0" animBg="1"/>
       <p:bldP spid="35" grpId="0" animBg="1"/>
+      <p:bldP spid="36" grpId="0"/>
+      <p:bldP spid="37" grpId="0"/>
       <p:bldP spid="38" grpId="0" animBg="1"/>
       <p:bldP spid="39" grpId="0" animBg="1"/>
+      <p:bldP spid="27" grpId="0"/>
+      <p:bldP spid="30" grpId="0" animBg="1"/>
     </p:bldLst>
   </p:timing>
 </p:sld>

</xml_diff>